<commit_message>
#585: Upper case on titles.
Former-commit-id: 1879d15f77cddbdc376feb4fd9fa16a110552bf7
</commit_message>
<xml_diff>
--- a/Articles/585/images/REST API.pptx
+++ b/Articles/585/images/REST API.pptx
@@ -1620,7 +1620,7 @@
             <a:fld id="{B1603AB5-52B7-8045-BEFE-97F8347DAEAC}" type="datetimeFigureOut">
               <a:rPr lang="en-US" smtClean="0"/>
               <a:pPr/>
-              <a:t>8/1/2023</a:t>
+              <a:t>12/2/2024</a:t>
             </a:fld>
             <a:endParaRPr lang="en-US"/>
           </a:p>
@@ -1788,7 +1788,7 @@
             <a:fld id="{EFF03303-0379-0E48-9B93-EC7286F8FEE5}" type="datetimeFigureOut">
               <a:rPr lang="en-US" smtClean="0"/>
               <a:pPr/>
-              <a:t>8/1/2023</a:t>
+              <a:t>12/2/2024</a:t>
             </a:fld>
             <a:endParaRPr lang="en-US"/>
           </a:p>
@@ -9578,8 +9578,11 @@
             <a:avLst/>
           </a:prstGeom>
           <a:solidFill>
-            <a:srgbClr val="FFFF99"/>
+            <a:schemeClr val="accent2"/>
           </a:solidFill>
+          <a:ln>
+            <a:noFill/>
+          </a:ln>
         </p:spPr>
         <p:style>
           <a:lnRef idx="1">
@@ -9599,49 +9602,60 @@
           <a:bodyPr rtlCol="0" anchor="t" anchorCtr="0"/>
           <a:lstStyle/>
           <a:p>
+            <a:pPr algn="ctr"/>
             <a:endParaRPr lang="en-GB" dirty="0">
               <a:solidFill>
-                <a:schemeClr val="tx1"/>
+                <a:schemeClr val="bg1"/>
               </a:solidFill>
+              <a:latin typeface="Avenir Next LT Pro" panose="020B0504020202020204" pitchFamily="34" charset="0"/>
             </a:endParaRPr>
           </a:p>
           <a:p>
+            <a:pPr algn="ctr"/>
             <a:endParaRPr lang="en-GB" dirty="0">
               <a:solidFill>
-                <a:schemeClr val="tx1"/>
+                <a:schemeClr val="bg1"/>
               </a:solidFill>
+              <a:latin typeface="Avenir Next LT Pro" panose="020B0504020202020204" pitchFamily="34" charset="0"/>
             </a:endParaRPr>
           </a:p>
           <a:p>
+            <a:pPr algn="ctr"/>
             <a:r>
               <a:rPr lang="en-GB" dirty="0">
                 <a:solidFill>
-                  <a:schemeClr val="tx1"/>
+                  <a:schemeClr val="bg1"/>
                 </a:solidFill>
+                <a:latin typeface="Avenir Next LT Pro" panose="020B0504020202020204" pitchFamily="34" charset="0"/>
               </a:rPr>
               <a:t>Client App</a:t>
             </a:r>
           </a:p>
           <a:p>
+            <a:pPr algn="ctr"/>
             <a:endParaRPr lang="en-GB" dirty="0">
               <a:solidFill>
-                <a:schemeClr val="tx1"/>
+                <a:schemeClr val="bg1"/>
               </a:solidFill>
+              <a:latin typeface="Avenir Next LT Pro" panose="020B0504020202020204" pitchFamily="34" charset="0"/>
             </a:endParaRPr>
           </a:p>
           <a:p>
+            <a:pPr algn="ctr"/>
             <a:r>
               <a:rPr lang="en-GB" dirty="0">
                 <a:solidFill>
-                  <a:schemeClr val="tx1"/>
+                  <a:schemeClr val="bg1"/>
                 </a:solidFill>
+                <a:latin typeface="Avenir Next LT Pro" panose="020B0504020202020204" pitchFamily="34" charset="0"/>
               </a:rPr>
               <a:t>Any Language</a:t>
             </a:r>
             <a:endParaRPr lang="en-NL" dirty="0">
               <a:solidFill>
-                <a:schemeClr val="tx1"/>
+                <a:schemeClr val="bg1"/>
               </a:solidFill>
+              <a:latin typeface="Avenir Next LT Pro" panose="020B0504020202020204" pitchFamily="34" charset="0"/>
             </a:endParaRPr>
           </a:p>
         </p:txBody>
@@ -9667,7 +9681,7 @@
             <a:avLst/>
           </a:prstGeom>
           <a:solidFill>
-            <a:srgbClr val="FFC000"/>
+            <a:schemeClr val="accent1"/>
           </a:solidFill>
         </p:spPr>
         <p:style>
@@ -9688,26 +9702,37 @@
           <a:bodyPr rtlCol="0" anchor="t" anchorCtr="0"/>
           <a:lstStyle/>
           <a:p>
+            <a:pPr algn="ctr"/>
             <a:endParaRPr lang="en-GB" dirty="0"/>
           </a:p>
           <a:p>
+            <a:pPr algn="ctr"/>
             <a:endParaRPr lang="en-GB" dirty="0"/>
           </a:p>
           <a:p>
-            <a:r>
-              <a:rPr lang="en-GB" dirty="0"/>
+            <a:pPr algn="ctr"/>
+            <a:r>
+              <a:rPr lang="en-GB" dirty="0">
+                <a:latin typeface="Avenir Next LT Pro" panose="020B0504020202020204" pitchFamily="34" charset="0"/>
+              </a:rPr>
               <a:t>Server App</a:t>
             </a:r>
           </a:p>
           <a:p>
+            <a:pPr algn="ctr"/>
             <a:endParaRPr lang="en-GB" dirty="0"/>
           </a:p>
           <a:p>
-            <a:r>
-              <a:rPr lang="en-GB" dirty="0"/>
+            <a:pPr algn="ctr"/>
+            <a:r>
+              <a:rPr lang="en-GB" dirty="0">
+                <a:latin typeface="Avenir Next LT Pro" panose="020B0504020202020204" pitchFamily="34" charset="0"/>
+              </a:rPr>
               <a:t>In AIMMS</a:t>
             </a:r>
-            <a:endParaRPr lang="en-NL" dirty="0"/>
+            <a:endParaRPr lang="en-NL" dirty="0">
+              <a:latin typeface="Avenir Next LT Pro" panose="020B0504020202020204" pitchFamily="34" charset="0"/>
+            </a:endParaRPr>
           </a:p>
         </p:txBody>
       </p:sp>
@@ -9816,8 +9841,8 @@
         </p:nvSpPr>
         <p:spPr>
           <a:xfrm>
-            <a:off x="5351703" y="2239181"/>
-            <a:ext cx="1909036" cy="614970"/>
+            <a:off x="4890064" y="2598873"/>
+            <a:ext cx="3223168" cy="614970"/>
           </a:xfrm>
           <a:prstGeom prst="rect">
             <a:avLst/>
@@ -9830,21 +9855,23 @@
           <a:lstStyle/>
           <a:p>
             <a:r>
-              <a:rPr lang="en-GB" sz="1800" cap="none" baseline="0" dirty="0">
+              <a:rPr lang="en-GB" sz="1400" cap="none" baseline="0" dirty="0">
                 <a:solidFill>
                   <a:schemeClr val="bg1">
                     <a:lumMod val="65000"/>
                   </a:schemeClr>
                 </a:solidFill>
+                <a:latin typeface="Avenir Next LT Pro" panose="020B0504020202020204" pitchFamily="34" charset="0"/>
               </a:rPr>
               <a:t>Request data, server format</a:t>
             </a:r>
-            <a:endParaRPr lang="en-NL" sz="1800" cap="none" baseline="0" dirty="0">
+            <a:endParaRPr lang="en-NL" sz="1400" cap="none" baseline="0" dirty="0">
               <a:solidFill>
                 <a:schemeClr val="bg1">
                   <a:lumMod val="65000"/>
                 </a:schemeClr>
               </a:solidFill>
+              <a:latin typeface="Avenir Next LT Pro" panose="020B0504020202020204" pitchFamily="34" charset="0"/>
             </a:endParaRPr>
           </a:p>
         </p:txBody>
@@ -9863,8 +9890,8 @@
         </p:nvSpPr>
         <p:spPr>
           <a:xfrm>
-            <a:off x="5351703" y="3427894"/>
-            <a:ext cx="1914862" cy="624157"/>
+            <a:off x="4890064" y="3744701"/>
+            <a:ext cx="3233004" cy="624157"/>
           </a:xfrm>
           <a:prstGeom prst="rect">
             <a:avLst/>
@@ -9877,21 +9904,23 @@
           <a:lstStyle/>
           <a:p>
             <a:r>
-              <a:rPr lang="en-GB" sz="1800" cap="none" baseline="0" dirty="0">
+              <a:rPr lang="en-GB" sz="1400" cap="none" baseline="0" dirty="0">
                 <a:solidFill>
                   <a:schemeClr val="bg1">
                     <a:lumMod val="65000"/>
                   </a:schemeClr>
                 </a:solidFill>
+                <a:latin typeface="Avenir Next LT Pro" panose="020B0504020202020204" pitchFamily="34" charset="0"/>
               </a:rPr>
               <a:t>Response data, server format</a:t>
             </a:r>
-            <a:endParaRPr lang="en-NL" sz="1800" cap="none" baseline="0" dirty="0">
+            <a:endParaRPr lang="en-NL" sz="1400" cap="none" baseline="0" dirty="0">
               <a:solidFill>
                 <a:schemeClr val="bg1">
                   <a:lumMod val="65000"/>
                 </a:schemeClr>
               </a:solidFill>
+              <a:latin typeface="Avenir Next LT Pro" panose="020B0504020202020204" pitchFamily="34" charset="0"/>
             </a:endParaRPr>
           </a:p>
         </p:txBody>
@@ -16132,18 +16161,18 @@
 </file>
 
 <file path=customXml/item1.xml><?xml version="1.0" encoding="utf-8"?>
-<p:properties xmlns:p="http://schemas.microsoft.com/office/2006/metadata/properties" xmlns:xsi="http://www.w3.org/2001/XMLSchema-instance" xmlns:pc="http://schemas.microsoft.com/office/infopath/2007/PartnerControls">
-  <documentManagement/>
-</p:properties>
-</file>
-
-<file path=customXml/item2.xml><?xml version="1.0" encoding="utf-8"?>
 <?mso-contentType ?>
 <FormTemplates xmlns="http://schemas.microsoft.com/sharepoint/v3/contenttype/forms">
   <Display>DocumentLibraryForm</Display>
   <Edit>DocumentLibraryForm</Edit>
   <New>DocumentLibraryForm</New>
 </FormTemplates>
+</file>
+
+<file path=customXml/item2.xml><?xml version="1.0" encoding="utf-8"?>
+<p:properties xmlns:p="http://schemas.microsoft.com/office/2006/metadata/properties" xmlns:xsi="http://www.w3.org/2001/XMLSchema-instance" xmlns:pc="http://schemas.microsoft.com/office/infopath/2007/PartnerControls">
+  <documentManagement/>
+</p:properties>
 </file>
 
 <file path=customXml/item3.xml><?xml version="1.0" encoding="utf-8"?>
@@ -16301,6 +16330,14 @@
 </file>
 
 <file path=customXml/itemProps1.xml><?xml version="1.0" encoding="utf-8"?>
+<ds:datastoreItem xmlns:ds="http://schemas.openxmlformats.org/officeDocument/2006/customXml" ds:itemID="{74BCA57B-8451-400D-AF6D-A9DBB4806AF2}">
+  <ds:schemaRefs>
+    <ds:schemaRef ds:uri="http://schemas.microsoft.com/sharepoint/v3/contenttype/forms"/>
+  </ds:schemaRefs>
+</ds:datastoreItem>
+</file>
+
+<file path=customXml/itemProps2.xml><?xml version="1.0" encoding="utf-8"?>
 <ds:datastoreItem xmlns:ds="http://schemas.openxmlformats.org/officeDocument/2006/customXml" ds:itemID="{F4BD4880-0C9A-491D-872C-CB84E58DA4AE}">
   <ds:schemaRefs>
     <ds:schemaRef ds:uri="67d1ba68-3275-44c2-9ddb-2f8511f2ccbb"/>
@@ -16312,14 +16349,6 @@
     <ds:schemaRef ds:uri="http://schemas.microsoft.com/office/2006/metadata/properties"/>
     <ds:schemaRef ds:uri="http://www.w3.org/XML/1998/namespace"/>
     <ds:schemaRef ds:uri="http://purl.org/dc/dcmitype/"/>
-  </ds:schemaRefs>
-</ds:datastoreItem>
-</file>
-
-<file path=customXml/itemProps2.xml><?xml version="1.0" encoding="utf-8"?>
-<ds:datastoreItem xmlns:ds="http://schemas.openxmlformats.org/officeDocument/2006/customXml" ds:itemID="{74BCA57B-8451-400D-AF6D-A9DBB4806AF2}">
-  <ds:schemaRefs>
-    <ds:schemaRef ds:uri="http://schemas.microsoft.com/sharepoint/v3/contenttype/forms"/>
   </ds:schemaRefs>
 </ds:datastoreItem>
 </file>

</xml_diff>